<commit_message>
Modify comments and the session inst image
</commit_message>
<xml_diff>
--- a/Code_ExperimentMVPA/Image/InstructionPPT.pptx
+++ b/Code_ExperimentMVPA/Image/InstructionPPT.pptx
@@ -265,7 +265,7 @@
           <a:p>
             <a:fld id="{4D1F3AD6-1B19-4B11-9609-A435173B2FBD}" type="datetimeFigureOut">
               <a:rPr lang="ko-KR" altLang="en-US" smtClean="0"/>
-              <a:t>2023-02-11</a:t>
+              <a:t>2023-02-12</a:t>
             </a:fld>
             <a:endParaRPr lang="ko-KR" altLang="en-US"/>
           </a:p>
@@ -463,7 +463,7 @@
           <a:p>
             <a:fld id="{4D1F3AD6-1B19-4B11-9609-A435173B2FBD}" type="datetimeFigureOut">
               <a:rPr lang="ko-KR" altLang="en-US" smtClean="0"/>
-              <a:t>2023-02-11</a:t>
+              <a:t>2023-02-12</a:t>
             </a:fld>
             <a:endParaRPr lang="ko-KR" altLang="en-US"/>
           </a:p>
@@ -671,7 +671,7 @@
           <a:p>
             <a:fld id="{4D1F3AD6-1B19-4B11-9609-A435173B2FBD}" type="datetimeFigureOut">
               <a:rPr lang="ko-KR" altLang="en-US" smtClean="0"/>
-              <a:t>2023-02-11</a:t>
+              <a:t>2023-02-12</a:t>
             </a:fld>
             <a:endParaRPr lang="ko-KR" altLang="en-US"/>
           </a:p>
@@ -869,7 +869,7 @@
           <a:p>
             <a:fld id="{4D1F3AD6-1B19-4B11-9609-A435173B2FBD}" type="datetimeFigureOut">
               <a:rPr lang="ko-KR" altLang="en-US" smtClean="0"/>
-              <a:t>2023-02-11</a:t>
+              <a:t>2023-02-12</a:t>
             </a:fld>
             <a:endParaRPr lang="ko-KR" altLang="en-US"/>
           </a:p>
@@ -1144,7 +1144,7 @@
           <a:p>
             <a:fld id="{4D1F3AD6-1B19-4B11-9609-A435173B2FBD}" type="datetimeFigureOut">
               <a:rPr lang="ko-KR" altLang="en-US" smtClean="0"/>
-              <a:t>2023-02-11</a:t>
+              <a:t>2023-02-12</a:t>
             </a:fld>
             <a:endParaRPr lang="ko-KR" altLang="en-US"/>
           </a:p>
@@ -1409,7 +1409,7 @@
           <a:p>
             <a:fld id="{4D1F3AD6-1B19-4B11-9609-A435173B2FBD}" type="datetimeFigureOut">
               <a:rPr lang="ko-KR" altLang="en-US" smtClean="0"/>
-              <a:t>2023-02-11</a:t>
+              <a:t>2023-02-12</a:t>
             </a:fld>
             <a:endParaRPr lang="ko-KR" altLang="en-US"/>
           </a:p>
@@ -1821,7 +1821,7 @@
           <a:p>
             <a:fld id="{4D1F3AD6-1B19-4B11-9609-A435173B2FBD}" type="datetimeFigureOut">
               <a:rPr lang="ko-KR" altLang="en-US" smtClean="0"/>
-              <a:t>2023-02-11</a:t>
+              <a:t>2023-02-12</a:t>
             </a:fld>
             <a:endParaRPr lang="ko-KR" altLang="en-US"/>
           </a:p>
@@ -1962,7 +1962,7 @@
           <a:p>
             <a:fld id="{4D1F3AD6-1B19-4B11-9609-A435173B2FBD}" type="datetimeFigureOut">
               <a:rPr lang="ko-KR" altLang="en-US" smtClean="0"/>
-              <a:t>2023-02-11</a:t>
+              <a:t>2023-02-12</a:t>
             </a:fld>
             <a:endParaRPr lang="ko-KR" altLang="en-US"/>
           </a:p>
@@ -2075,7 +2075,7 @@
           <a:p>
             <a:fld id="{4D1F3AD6-1B19-4B11-9609-A435173B2FBD}" type="datetimeFigureOut">
               <a:rPr lang="ko-KR" altLang="en-US" smtClean="0"/>
-              <a:t>2023-02-11</a:t>
+              <a:t>2023-02-12</a:t>
             </a:fld>
             <a:endParaRPr lang="ko-KR" altLang="en-US"/>
           </a:p>
@@ -2386,7 +2386,7 @@
           <a:p>
             <a:fld id="{4D1F3AD6-1B19-4B11-9609-A435173B2FBD}" type="datetimeFigureOut">
               <a:rPr lang="ko-KR" altLang="en-US" smtClean="0"/>
-              <a:t>2023-02-11</a:t>
+              <a:t>2023-02-12</a:t>
             </a:fld>
             <a:endParaRPr lang="ko-KR" altLang="en-US"/>
           </a:p>
@@ -2674,7 +2674,7 @@
           <a:p>
             <a:fld id="{4D1F3AD6-1B19-4B11-9609-A435173B2FBD}" type="datetimeFigureOut">
               <a:rPr lang="ko-KR" altLang="en-US" smtClean="0"/>
-              <a:t>2023-02-11</a:t>
+              <a:t>2023-02-12</a:t>
             </a:fld>
             <a:endParaRPr lang="ko-KR" altLang="en-US"/>
           </a:p>
@@ -2915,7 +2915,7 @@
           <a:p>
             <a:fld id="{4D1F3AD6-1B19-4B11-9609-A435173B2FBD}" type="datetimeFigureOut">
               <a:rPr lang="ko-KR" altLang="en-US" smtClean="0"/>
-              <a:t>2023-02-11</a:t>
+              <a:t>2023-02-12</a:t>
             </a:fld>
             <a:endParaRPr lang="ko-KR" altLang="en-US"/>
           </a:p>
@@ -11340,51 +11340,6 @@
             </a:fontRef>
           </p:style>
         </p:cxnSp>
-        <p:sp>
-          <p:nvSpPr>
-            <p:cNvPr id="20" name="TextBox 19">
-              <a:extLst>
-                <a:ext uri="{FF2B5EF4-FFF2-40B4-BE49-F238E27FC236}">
-                  <a16:creationId xmlns:a16="http://schemas.microsoft.com/office/drawing/2014/main" id="{D1D8F433-AD73-4810-90B2-067D702A5249}"/>
-                </a:ext>
-              </a:extLst>
-            </p:cNvPr>
-            <p:cNvSpPr txBox="1"/>
-            <p:nvPr/>
-          </p:nvSpPr>
-          <p:spPr>
-            <a:xfrm>
-              <a:off x="1298151" y="1460614"/>
-              <a:ext cx="572594" cy="307777"/>
-            </a:xfrm>
-            <a:prstGeom prst="rect">
-              <a:avLst/>
-            </a:prstGeom>
-            <a:noFill/>
-          </p:spPr>
-          <p:txBody>
-            <a:bodyPr wrap="none" rtlCol="0">
-              <a:spAutoFit/>
-            </a:bodyPr>
-            <a:lstStyle/>
-            <a:p>
-              <a:pPr algn="r"/>
-              <a:r>
-                <a:rPr lang="en-US" altLang="ko-KR" sz="1400" b="1" dirty="0">
-                  <a:solidFill>
-                    <a:schemeClr val="bg1"/>
-                  </a:solidFill>
-                </a:rPr>
-                <a:t>+90˚</a:t>
-              </a:r>
-              <a:endParaRPr lang="ko-KR" altLang="en-US" sz="1400" b="1" dirty="0">
-                <a:solidFill>
-                  <a:schemeClr val="bg1"/>
-                </a:solidFill>
-              </a:endParaRPr>
-            </a:p>
-          </p:txBody>
-        </p:sp>
         <p:pic>
           <p:nvPicPr>
             <p:cNvPr id="21" name="Picture 6" descr="8 Black and white arrow no pixel mouse hand cursors icons vector  illustration set flat style design isolated on white background. 3601086  Vector Art at Vecteezy">

</xml_diff>